<commit_message>
add slide showing which files generate which files
git-svn-id: https://cbilsvn.pmacs.upenn.edu/svn/gus/ReFlow/trunk@9375 4235af6a-31f9-0310-9ad3-ecf6348f2534
</commit_message>
<xml_diff>
--- a/Dataset/doc/Overview.pptx
+++ b/Dataset/doc/Overview.pptx
@@ -6,6 +6,7 @@
   </p:sldMasterIdLst>
   <p:sldIdLst>
     <p:sldId id="256" r:id="rId2"/>
+    <p:sldId id="257" r:id="rId3"/>
   </p:sldIdLst>
   <p:sldSz cx="9144000" cy="6858000" type="screen4x3"/>
   <p:notesSz cx="6858000" cy="9144000"/>
@@ -3045,6 +3046,14 @@
 <file path=ppt/slides/slide1.xml><?xml version="1.0" encoding="utf-8"?>
 <p:sld xmlns:a="http://schemas.openxmlformats.org/drawingml/2006/main" xmlns:r="http://schemas.openxmlformats.org/officeDocument/2006/relationships" xmlns:p="http://schemas.openxmlformats.org/presentationml/2006/main">
   <p:cSld>
+    <p:bg>
+      <p:bgPr>
+        <a:solidFill>
+          <a:schemeClr val="bg1"/>
+        </a:solidFill>
+        <a:effectLst/>
+      </p:bgPr>
+    </p:bg>
     <p:spTree>
       <p:nvGrpSpPr>
         <p:cNvPr id="1" name=""/>
@@ -3079,6 +3088,10 @@
               <a:lumOff val="80000"/>
             </a:schemeClr>
           </a:solidFill>
+          <a:ln w="12700">
+            <a:noFill/>
+            <a:prstDash val="solid"/>
+          </a:ln>
         </p:spPr>
         <p:style>
           <a:lnRef idx="2">
@@ -4517,7 +4530,9 @@
           <a:prstGeom prst="rect">
             <a:avLst/>
           </a:prstGeom>
-          <a:noFill/>
+          <a:solidFill>
+            <a:schemeClr val="bg1"/>
+          </a:solidFill>
         </p:spPr>
         <p:style>
           <a:lnRef idx="2">
@@ -4751,7 +4766,9 @@
           <a:prstGeom prst="rect">
             <a:avLst/>
           </a:prstGeom>
-          <a:noFill/>
+          <a:solidFill>
+            <a:schemeClr val="bg1"/>
+          </a:solidFill>
         </p:spPr>
         <p:style>
           <a:lnRef idx="2">
@@ -4808,7 +4825,9 @@
           <a:prstGeom prst="rect">
             <a:avLst/>
           </a:prstGeom>
-          <a:noFill/>
+          <a:solidFill>
+            <a:schemeClr val="bg1"/>
+          </a:solidFill>
         </p:spPr>
         <p:style>
           <a:lnRef idx="2">
@@ -5048,7 +5067,9 @@
           <a:prstGeom prst="rect">
             <a:avLst/>
           </a:prstGeom>
-          <a:noFill/>
+          <a:solidFill>
+            <a:schemeClr val="bg1"/>
+          </a:solidFill>
         </p:spPr>
         <p:style>
           <a:lnRef idx="2">
@@ -5884,6 +5905,1412 @@
       </p:par>
     </p:tnLst>
   </p:timing>
+</p:sld>
+</file>
+
+<file path=ppt/slides/slide2.xml><?xml version="1.0" encoding="utf-8"?>
+<p:sld xmlns:a="http://schemas.openxmlformats.org/drawingml/2006/main" xmlns:r="http://schemas.openxmlformats.org/officeDocument/2006/relationships" xmlns:p="http://schemas.openxmlformats.org/presentationml/2006/main">
+  <p:cSld>
+    <p:spTree>
+      <p:nvGrpSpPr>
+        <p:cNvPr id="1" name=""/>
+        <p:cNvGrpSpPr/>
+        <p:nvPr/>
+      </p:nvGrpSpPr>
+      <p:grpSpPr>
+        <a:xfrm>
+          <a:off x="0" y="0"/>
+          <a:ext cx="0" cy="0"/>
+          <a:chOff x="0" y="0"/>
+          <a:chExt cx="0" cy="0"/>
+        </a:xfrm>
+      </p:grpSpPr>
+      <p:sp>
+        <p:nvSpPr>
+          <p:cNvPr id="17" name="Rounded Rectangle 16"/>
+          <p:cNvSpPr/>
+          <p:nvPr/>
+        </p:nvSpPr>
+        <p:spPr>
+          <a:xfrm>
+            <a:off x="4114800" y="2895600"/>
+            <a:ext cx="4648200" cy="3657600"/>
+          </a:xfrm>
+          <a:prstGeom prst="roundRect">
+            <a:avLst/>
+          </a:prstGeom>
+          <a:solidFill>
+            <a:schemeClr val="tx2">
+              <a:lumMod val="20000"/>
+              <a:lumOff val="80000"/>
+            </a:schemeClr>
+          </a:solidFill>
+        </p:spPr>
+        <p:style>
+          <a:lnRef idx="2">
+            <a:schemeClr val="accent1">
+              <a:shade val="50000"/>
+            </a:schemeClr>
+          </a:lnRef>
+          <a:fillRef idx="1">
+            <a:schemeClr val="accent1"/>
+          </a:fillRef>
+          <a:effectRef idx="0">
+            <a:schemeClr val="accent1"/>
+          </a:effectRef>
+          <a:fontRef idx="minor">
+            <a:schemeClr val="lt1"/>
+          </a:fontRef>
+        </p:style>
+        <p:txBody>
+          <a:bodyPr rtlCol="0" anchor="ctr"/>
+          <a:lstStyle/>
+          <a:p>
+            <a:pPr algn="ctr"/>
+            <a:endParaRPr lang="en-US" dirty="0" smtClean="0"/>
+          </a:p>
+          <a:p>
+            <a:pPr algn="ctr"/>
+            <a:endParaRPr lang="en-US" dirty="0" smtClean="0"/>
+          </a:p>
+          <a:p>
+            <a:pPr algn="ctr"/>
+            <a:endParaRPr lang="en-US" dirty="0" smtClean="0"/>
+          </a:p>
+          <a:p>
+            <a:pPr algn="ctr"/>
+            <a:endParaRPr lang="en-US" dirty="0" smtClean="0"/>
+          </a:p>
+          <a:p>
+            <a:pPr algn="ctr"/>
+            <a:endParaRPr lang="en-US" dirty="0" smtClean="0"/>
+          </a:p>
+          <a:p>
+            <a:pPr algn="ctr"/>
+            <a:endParaRPr lang="en-US" dirty="0" smtClean="0">
+              <a:solidFill>
+                <a:schemeClr val="bg2">
+                  <a:lumMod val="10000"/>
+                </a:schemeClr>
+              </a:solidFill>
+            </a:endParaRPr>
+          </a:p>
+          <a:p>
+            <a:pPr algn="ctr"/>
+            <a:endParaRPr lang="en-US" dirty="0" smtClean="0">
+              <a:solidFill>
+                <a:schemeClr val="bg2">
+                  <a:lumMod val="10000"/>
+                </a:schemeClr>
+              </a:solidFill>
+            </a:endParaRPr>
+          </a:p>
+          <a:p>
+            <a:pPr algn="ctr"/>
+            <a:endParaRPr lang="en-US" dirty="0" smtClean="0">
+              <a:solidFill>
+                <a:schemeClr val="bg2">
+                  <a:lumMod val="10000"/>
+                </a:schemeClr>
+              </a:solidFill>
+            </a:endParaRPr>
+          </a:p>
+          <a:p>
+            <a:pPr algn="ctr"/>
+            <a:endParaRPr lang="en-US" dirty="0" smtClean="0">
+              <a:solidFill>
+                <a:schemeClr val="bg2">
+                  <a:lumMod val="10000"/>
+                </a:schemeClr>
+              </a:solidFill>
+            </a:endParaRPr>
+          </a:p>
+          <a:p>
+            <a:pPr algn="ctr"/>
+            <a:endParaRPr lang="en-US" dirty="0" smtClean="0">
+              <a:solidFill>
+                <a:schemeClr val="bg2">
+                  <a:lumMod val="10000"/>
+                </a:schemeClr>
+              </a:solidFill>
+            </a:endParaRPr>
+          </a:p>
+          <a:p>
+            <a:pPr algn="ctr"/>
+            <a:endParaRPr lang="en-US" dirty="0" smtClean="0">
+              <a:solidFill>
+                <a:schemeClr val="bg2">
+                  <a:lumMod val="10000"/>
+                </a:schemeClr>
+              </a:solidFill>
+            </a:endParaRPr>
+          </a:p>
+          <a:p>
+            <a:pPr algn="ctr"/>
+            <a:endParaRPr lang="en-US" dirty="0" smtClean="0">
+              <a:solidFill>
+                <a:schemeClr val="bg2">
+                  <a:lumMod val="10000"/>
+                </a:schemeClr>
+              </a:solidFill>
+            </a:endParaRPr>
+          </a:p>
+          <a:p>
+            <a:pPr algn="ctr"/>
+            <a:r>
+              <a:rPr lang="en-US" dirty="0" smtClean="0">
+                <a:solidFill>
+                  <a:schemeClr val="bg2">
+                    <a:lumMod val="10000"/>
+                  </a:schemeClr>
+                </a:solidFill>
+              </a:rPr>
+              <a:t>Graph Files</a:t>
+            </a:r>
+            <a:endParaRPr lang="en-US" dirty="0">
+              <a:solidFill>
+                <a:schemeClr val="bg2">
+                  <a:lumMod val="10000"/>
+                </a:schemeClr>
+              </a:solidFill>
+            </a:endParaRPr>
+          </a:p>
+        </p:txBody>
+      </p:sp>
+      <p:sp>
+        <p:nvSpPr>
+          <p:cNvPr id="16" name="Rounded Rectangle 15"/>
+          <p:cNvSpPr/>
+          <p:nvPr/>
+        </p:nvSpPr>
+        <p:spPr>
+          <a:xfrm>
+            <a:off x="152400" y="2895600"/>
+            <a:ext cx="3352800" cy="3657600"/>
+          </a:xfrm>
+          <a:prstGeom prst="roundRect">
+            <a:avLst/>
+          </a:prstGeom>
+          <a:solidFill>
+            <a:schemeClr val="tx2">
+              <a:lumMod val="20000"/>
+              <a:lumOff val="80000"/>
+            </a:schemeClr>
+          </a:solidFill>
+        </p:spPr>
+        <p:style>
+          <a:lnRef idx="2">
+            <a:schemeClr val="accent1">
+              <a:shade val="50000"/>
+            </a:schemeClr>
+          </a:lnRef>
+          <a:fillRef idx="1">
+            <a:schemeClr val="accent1"/>
+          </a:fillRef>
+          <a:effectRef idx="0">
+            <a:schemeClr val="accent1"/>
+          </a:effectRef>
+          <a:fontRef idx="minor">
+            <a:schemeClr val="lt1"/>
+          </a:fontRef>
+        </p:style>
+        <p:txBody>
+          <a:bodyPr rtlCol="0" anchor="ctr"/>
+          <a:lstStyle/>
+          <a:p>
+            <a:pPr algn="ctr"/>
+            <a:endParaRPr lang="en-US" dirty="0" smtClean="0"/>
+          </a:p>
+          <a:p>
+            <a:pPr algn="ctr"/>
+            <a:endParaRPr lang="en-US" dirty="0" smtClean="0"/>
+          </a:p>
+          <a:p>
+            <a:pPr algn="ctr"/>
+            <a:endParaRPr lang="en-US" dirty="0" smtClean="0"/>
+          </a:p>
+          <a:p>
+            <a:pPr algn="ctr"/>
+            <a:endParaRPr lang="en-US" dirty="0" smtClean="0"/>
+          </a:p>
+          <a:p>
+            <a:pPr algn="ctr"/>
+            <a:endParaRPr lang="en-US" dirty="0" smtClean="0"/>
+          </a:p>
+          <a:p>
+            <a:pPr algn="ctr"/>
+            <a:endParaRPr lang="en-US" dirty="0" smtClean="0">
+              <a:solidFill>
+                <a:schemeClr val="bg2">
+                  <a:lumMod val="10000"/>
+                </a:schemeClr>
+              </a:solidFill>
+            </a:endParaRPr>
+          </a:p>
+          <a:p>
+            <a:pPr algn="ctr"/>
+            <a:endParaRPr lang="en-US" dirty="0" smtClean="0">
+              <a:solidFill>
+                <a:schemeClr val="bg2">
+                  <a:lumMod val="10000"/>
+                </a:schemeClr>
+              </a:solidFill>
+            </a:endParaRPr>
+          </a:p>
+          <a:p>
+            <a:pPr algn="ctr"/>
+            <a:endParaRPr lang="en-US" dirty="0" smtClean="0">
+              <a:solidFill>
+                <a:schemeClr val="bg2">
+                  <a:lumMod val="10000"/>
+                </a:schemeClr>
+              </a:solidFill>
+            </a:endParaRPr>
+          </a:p>
+          <a:p>
+            <a:pPr algn="ctr"/>
+            <a:endParaRPr lang="en-US" dirty="0" smtClean="0">
+              <a:solidFill>
+                <a:schemeClr val="bg2">
+                  <a:lumMod val="10000"/>
+                </a:schemeClr>
+              </a:solidFill>
+            </a:endParaRPr>
+          </a:p>
+          <a:p>
+            <a:pPr algn="ctr"/>
+            <a:endParaRPr lang="en-US" dirty="0" smtClean="0">
+              <a:solidFill>
+                <a:schemeClr val="bg2">
+                  <a:lumMod val="10000"/>
+                </a:schemeClr>
+              </a:solidFill>
+            </a:endParaRPr>
+          </a:p>
+          <a:p>
+            <a:pPr algn="ctr"/>
+            <a:endParaRPr lang="en-US" dirty="0" smtClean="0">
+              <a:solidFill>
+                <a:schemeClr val="bg2">
+                  <a:lumMod val="10000"/>
+                </a:schemeClr>
+              </a:solidFill>
+            </a:endParaRPr>
+          </a:p>
+          <a:p>
+            <a:pPr algn="ctr"/>
+            <a:endParaRPr lang="en-US" dirty="0" smtClean="0">
+              <a:solidFill>
+                <a:schemeClr val="bg2">
+                  <a:lumMod val="10000"/>
+                </a:schemeClr>
+              </a:solidFill>
+            </a:endParaRPr>
+          </a:p>
+          <a:p>
+            <a:pPr algn="ctr"/>
+            <a:r>
+              <a:rPr lang="en-US" dirty="0" smtClean="0">
+                <a:solidFill>
+                  <a:schemeClr val="bg2">
+                    <a:lumMod val="10000"/>
+                  </a:schemeClr>
+                </a:solidFill>
+              </a:rPr>
+              <a:t>Resource Files</a:t>
+            </a:r>
+            <a:endParaRPr lang="en-US" dirty="0">
+              <a:solidFill>
+                <a:schemeClr val="bg2">
+                  <a:lumMod val="10000"/>
+                </a:schemeClr>
+              </a:solidFill>
+            </a:endParaRPr>
+          </a:p>
+        </p:txBody>
+      </p:sp>
+      <p:sp>
+        <p:nvSpPr>
+          <p:cNvPr id="15" name="Rounded Rectangle 14"/>
+          <p:cNvSpPr/>
+          <p:nvPr/>
+        </p:nvSpPr>
+        <p:spPr>
+          <a:xfrm>
+            <a:off x="2438400" y="152400"/>
+            <a:ext cx="4114800" cy="2057400"/>
+          </a:xfrm>
+          <a:prstGeom prst="roundRect">
+            <a:avLst/>
+          </a:prstGeom>
+          <a:solidFill>
+            <a:schemeClr val="tx2">
+              <a:lumMod val="20000"/>
+              <a:lumOff val="80000"/>
+            </a:schemeClr>
+          </a:solidFill>
+        </p:spPr>
+        <p:style>
+          <a:lnRef idx="2">
+            <a:schemeClr val="accent1">
+              <a:shade val="50000"/>
+            </a:schemeClr>
+          </a:lnRef>
+          <a:fillRef idx="1">
+            <a:schemeClr val="accent1"/>
+          </a:fillRef>
+          <a:effectRef idx="0">
+            <a:schemeClr val="accent1"/>
+          </a:effectRef>
+          <a:fontRef idx="minor">
+            <a:schemeClr val="lt1"/>
+          </a:fontRef>
+        </p:style>
+        <p:txBody>
+          <a:bodyPr rtlCol="0" anchor="ctr"/>
+          <a:lstStyle/>
+          <a:p>
+            <a:pPr algn="ctr"/>
+            <a:endParaRPr lang="en-US" dirty="0" smtClean="0"/>
+          </a:p>
+          <a:p>
+            <a:pPr algn="ctr"/>
+            <a:endParaRPr lang="en-US" dirty="0" smtClean="0"/>
+          </a:p>
+          <a:p>
+            <a:pPr algn="ctr"/>
+            <a:endParaRPr lang="en-US" dirty="0" smtClean="0"/>
+          </a:p>
+          <a:p>
+            <a:pPr algn="ctr"/>
+            <a:endParaRPr lang="en-US" dirty="0" smtClean="0"/>
+          </a:p>
+          <a:p>
+            <a:pPr algn="ctr"/>
+            <a:endParaRPr lang="en-US" dirty="0" smtClean="0"/>
+          </a:p>
+          <a:p>
+            <a:pPr algn="ctr"/>
+            <a:endParaRPr lang="en-US" dirty="0" smtClean="0">
+              <a:solidFill>
+                <a:schemeClr val="bg2">
+                  <a:lumMod val="10000"/>
+                </a:schemeClr>
+              </a:solidFill>
+            </a:endParaRPr>
+          </a:p>
+          <a:p>
+            <a:pPr algn="ctr"/>
+            <a:r>
+              <a:rPr lang="en-US" dirty="0" smtClean="0">
+                <a:solidFill>
+                  <a:schemeClr val="bg2">
+                    <a:lumMod val="10000"/>
+                  </a:schemeClr>
+                </a:solidFill>
+              </a:rPr>
+              <a:t>Dataset Files</a:t>
+            </a:r>
+            <a:endParaRPr lang="en-US" dirty="0">
+              <a:solidFill>
+                <a:schemeClr val="bg2">
+                  <a:lumMod val="10000"/>
+                </a:schemeClr>
+              </a:solidFill>
+            </a:endParaRPr>
+          </a:p>
+        </p:txBody>
+      </p:sp>
+      <p:sp>
+        <p:nvSpPr>
+          <p:cNvPr id="2" name="Rectangle 1"/>
+          <p:cNvSpPr/>
+          <p:nvPr/>
+        </p:nvSpPr>
+        <p:spPr>
+          <a:xfrm>
+            <a:off x="3200400" y="304800"/>
+            <a:ext cx="2667000" cy="304800"/>
+          </a:xfrm>
+          <a:prstGeom prst="rect">
+            <a:avLst/>
+          </a:prstGeom>
+          <a:solidFill>
+            <a:schemeClr val="bg2"/>
+          </a:solidFill>
+        </p:spPr>
+        <p:style>
+          <a:lnRef idx="2">
+            <a:schemeClr val="accent1">
+              <a:shade val="50000"/>
+            </a:schemeClr>
+          </a:lnRef>
+          <a:fillRef idx="1">
+            <a:schemeClr val="accent1"/>
+          </a:fillRef>
+          <a:effectRef idx="0">
+            <a:schemeClr val="accent1"/>
+          </a:effectRef>
+          <a:fontRef idx="minor">
+            <a:schemeClr val="lt1"/>
+          </a:fontRef>
+        </p:style>
+        <p:txBody>
+          <a:bodyPr rtlCol="0" anchor="ctr"/>
+          <a:lstStyle/>
+          <a:p>
+            <a:r>
+              <a:rPr lang="en-US" sz="1100" dirty="0" smtClean="0">
+                <a:solidFill>
+                  <a:schemeClr val="tx1"/>
+                </a:solidFill>
+                <a:latin typeface="Courier New" pitchFamily="49" charset="0"/>
+                <a:cs typeface="Courier New" pitchFamily="49" charset="0"/>
+              </a:rPr>
+              <a:t>ToxoDB.xml</a:t>
+            </a:r>
+          </a:p>
+        </p:txBody>
+      </p:sp>
+      <p:sp>
+        <p:nvSpPr>
+          <p:cNvPr id="3" name="Rectangle 2"/>
+          <p:cNvSpPr/>
+          <p:nvPr/>
+        </p:nvSpPr>
+        <p:spPr>
+          <a:xfrm>
+            <a:off x="3200400" y="838200"/>
+            <a:ext cx="2667000" cy="304800"/>
+          </a:xfrm>
+          <a:prstGeom prst="rect">
+            <a:avLst/>
+          </a:prstGeom>
+          <a:solidFill>
+            <a:schemeClr val="bg2"/>
+          </a:solidFill>
+        </p:spPr>
+        <p:style>
+          <a:lnRef idx="2">
+            <a:schemeClr val="accent1">
+              <a:shade val="50000"/>
+            </a:schemeClr>
+          </a:lnRef>
+          <a:fillRef idx="1">
+            <a:schemeClr val="accent1"/>
+          </a:fillRef>
+          <a:effectRef idx="0">
+            <a:schemeClr val="accent1"/>
+          </a:effectRef>
+          <a:fontRef idx="minor">
+            <a:schemeClr val="lt1"/>
+          </a:fontRef>
+        </p:style>
+        <p:txBody>
+          <a:bodyPr rtlCol="0" anchor="ctr"/>
+          <a:lstStyle/>
+          <a:p>
+            <a:r>
+              <a:rPr lang="en-US" sz="1100" dirty="0" err="1" smtClean="0">
+                <a:solidFill>
+                  <a:schemeClr val="tx1"/>
+                </a:solidFill>
+                <a:latin typeface="Courier New" pitchFamily="49" charset="0"/>
+                <a:cs typeface="Courier New" pitchFamily="49" charset="0"/>
+              </a:rPr>
+              <a:t>ToxoDB</a:t>
+            </a:r>
+            <a:r>
+              <a:rPr lang="en-US" sz="1100" dirty="0" smtClean="0">
+                <a:solidFill>
+                  <a:schemeClr val="tx1"/>
+                </a:solidFill>
+                <a:latin typeface="Courier New" pitchFamily="49" charset="0"/>
+                <a:cs typeface="Courier New" pitchFamily="49" charset="0"/>
+              </a:rPr>
+              <a:t>/tgonME49.xml</a:t>
+            </a:r>
+          </a:p>
+        </p:txBody>
+      </p:sp>
+      <p:sp>
+        <p:nvSpPr>
+          <p:cNvPr id="4" name="Rectangle 3"/>
+          <p:cNvSpPr/>
+          <p:nvPr/>
+        </p:nvSpPr>
+        <p:spPr>
+          <a:xfrm>
+            <a:off x="3200400" y="1371600"/>
+            <a:ext cx="2667000" cy="304800"/>
+          </a:xfrm>
+          <a:prstGeom prst="rect">
+            <a:avLst/>
+          </a:prstGeom>
+          <a:solidFill>
+            <a:schemeClr val="bg2"/>
+          </a:solidFill>
+        </p:spPr>
+        <p:style>
+          <a:lnRef idx="2">
+            <a:schemeClr val="accent1">
+              <a:shade val="50000"/>
+            </a:schemeClr>
+          </a:lnRef>
+          <a:fillRef idx="1">
+            <a:schemeClr val="accent1"/>
+          </a:fillRef>
+          <a:effectRef idx="0">
+            <a:schemeClr val="accent1"/>
+          </a:effectRef>
+          <a:fontRef idx="minor">
+            <a:schemeClr val="lt1"/>
+          </a:fontRef>
+        </p:style>
+        <p:txBody>
+          <a:bodyPr rtlCol="0" anchor="ctr"/>
+          <a:lstStyle/>
+          <a:p>
+            <a:r>
+              <a:rPr lang="en-US" sz="1100" dirty="0" err="1" smtClean="0">
+                <a:solidFill>
+                  <a:schemeClr val="tx1"/>
+                </a:solidFill>
+                <a:latin typeface="Courier New" pitchFamily="49" charset="0"/>
+                <a:cs typeface="Courier New" pitchFamily="49" charset="0"/>
+              </a:rPr>
+              <a:t>ToxoDB</a:t>
+            </a:r>
+            <a:r>
+              <a:rPr lang="en-US" sz="1100" dirty="0" smtClean="0">
+                <a:solidFill>
+                  <a:schemeClr val="tx1"/>
+                </a:solidFill>
+                <a:latin typeface="Courier New" pitchFamily="49" charset="0"/>
+                <a:cs typeface="Courier New" pitchFamily="49" charset="0"/>
+              </a:rPr>
+              <a:t>/tgonME49/Einstein.xml</a:t>
+            </a:r>
+          </a:p>
+        </p:txBody>
+      </p:sp>
+      <p:sp>
+        <p:nvSpPr>
+          <p:cNvPr id="5" name="Rectangle 4"/>
+          <p:cNvSpPr/>
+          <p:nvPr/>
+        </p:nvSpPr>
+        <p:spPr>
+          <a:xfrm>
+            <a:off x="457200" y="3124200"/>
+            <a:ext cx="2667000" cy="304800"/>
+          </a:xfrm>
+          <a:prstGeom prst="rect">
+            <a:avLst/>
+          </a:prstGeom>
+          <a:solidFill>
+            <a:schemeClr val="bg2"/>
+          </a:solidFill>
+        </p:spPr>
+        <p:style>
+          <a:lnRef idx="2">
+            <a:schemeClr val="accent1">
+              <a:shade val="50000"/>
+            </a:schemeClr>
+          </a:lnRef>
+          <a:fillRef idx="1">
+            <a:schemeClr val="accent1"/>
+          </a:fillRef>
+          <a:effectRef idx="0">
+            <a:schemeClr val="accent1"/>
+          </a:effectRef>
+          <a:fontRef idx="minor">
+            <a:schemeClr val="lt1"/>
+          </a:fontRef>
+        </p:style>
+        <p:txBody>
+          <a:bodyPr rtlCol="0" anchor="ctr"/>
+          <a:lstStyle/>
+          <a:p>
+            <a:r>
+              <a:rPr lang="en-US" sz="1100" dirty="0" smtClean="0">
+                <a:solidFill>
+                  <a:schemeClr val="tx1"/>
+                </a:solidFill>
+                <a:latin typeface="Courier New" pitchFamily="49" charset="0"/>
+                <a:cs typeface="Courier New" pitchFamily="49" charset="0"/>
+              </a:rPr>
+              <a:t>ToxoDB.xml</a:t>
+            </a:r>
+          </a:p>
+        </p:txBody>
+      </p:sp>
+      <p:sp>
+        <p:nvSpPr>
+          <p:cNvPr id="6" name="Rectangle 5"/>
+          <p:cNvSpPr/>
+          <p:nvPr/>
+        </p:nvSpPr>
+        <p:spPr>
+          <a:xfrm>
+            <a:off x="457200" y="3657600"/>
+            <a:ext cx="2667000" cy="304800"/>
+          </a:xfrm>
+          <a:prstGeom prst="rect">
+            <a:avLst/>
+          </a:prstGeom>
+          <a:solidFill>
+            <a:schemeClr val="bg2"/>
+          </a:solidFill>
+        </p:spPr>
+        <p:style>
+          <a:lnRef idx="2">
+            <a:schemeClr val="accent1">
+              <a:shade val="50000"/>
+            </a:schemeClr>
+          </a:lnRef>
+          <a:fillRef idx="1">
+            <a:schemeClr val="accent1"/>
+          </a:fillRef>
+          <a:effectRef idx="0">
+            <a:schemeClr val="accent1"/>
+          </a:effectRef>
+          <a:fontRef idx="minor">
+            <a:schemeClr val="lt1"/>
+          </a:fontRef>
+        </p:style>
+        <p:txBody>
+          <a:bodyPr rtlCol="0" anchor="ctr"/>
+          <a:lstStyle/>
+          <a:p>
+            <a:r>
+              <a:rPr lang="en-US" sz="1100" dirty="0" err="1" smtClean="0">
+                <a:solidFill>
+                  <a:schemeClr val="tx1"/>
+                </a:solidFill>
+                <a:latin typeface="Courier New" pitchFamily="49" charset="0"/>
+                <a:cs typeface="Courier New" pitchFamily="49" charset="0"/>
+              </a:rPr>
+              <a:t>ToxoDB</a:t>
+            </a:r>
+            <a:r>
+              <a:rPr lang="en-US" sz="1100" dirty="0" smtClean="0">
+                <a:solidFill>
+                  <a:schemeClr val="tx1"/>
+                </a:solidFill>
+                <a:latin typeface="Courier New" pitchFamily="49" charset="0"/>
+                <a:cs typeface="Courier New" pitchFamily="49" charset="0"/>
+              </a:rPr>
+              <a:t>/tgonME49.xml</a:t>
+            </a:r>
+          </a:p>
+        </p:txBody>
+      </p:sp>
+      <p:sp>
+        <p:nvSpPr>
+          <p:cNvPr id="7" name="Rectangle 6"/>
+          <p:cNvSpPr/>
+          <p:nvPr/>
+        </p:nvSpPr>
+        <p:spPr>
+          <a:xfrm>
+            <a:off x="457200" y="4191000"/>
+            <a:ext cx="2667000" cy="304800"/>
+          </a:xfrm>
+          <a:prstGeom prst="rect">
+            <a:avLst/>
+          </a:prstGeom>
+          <a:solidFill>
+            <a:schemeClr val="bg2"/>
+          </a:solidFill>
+        </p:spPr>
+        <p:style>
+          <a:lnRef idx="2">
+            <a:schemeClr val="accent1">
+              <a:shade val="50000"/>
+            </a:schemeClr>
+          </a:lnRef>
+          <a:fillRef idx="1">
+            <a:schemeClr val="accent1"/>
+          </a:fillRef>
+          <a:effectRef idx="0">
+            <a:schemeClr val="accent1"/>
+          </a:effectRef>
+          <a:fontRef idx="minor">
+            <a:schemeClr val="lt1"/>
+          </a:fontRef>
+        </p:style>
+        <p:txBody>
+          <a:bodyPr rtlCol="0" anchor="ctr"/>
+          <a:lstStyle/>
+          <a:p>
+            <a:r>
+              <a:rPr lang="en-US" sz="1100" dirty="0" err="1" smtClean="0">
+                <a:solidFill>
+                  <a:schemeClr val="tx1"/>
+                </a:solidFill>
+                <a:latin typeface="Courier New" pitchFamily="49" charset="0"/>
+                <a:cs typeface="Courier New" pitchFamily="49" charset="0"/>
+              </a:rPr>
+              <a:t>ToxoDB</a:t>
+            </a:r>
+            <a:r>
+              <a:rPr lang="en-US" sz="1100" dirty="0" smtClean="0">
+                <a:solidFill>
+                  <a:schemeClr val="tx1"/>
+                </a:solidFill>
+                <a:latin typeface="Courier New" pitchFamily="49" charset="0"/>
+                <a:cs typeface="Courier New" pitchFamily="49" charset="0"/>
+              </a:rPr>
+              <a:t>/tgonME49/Einstein.xml</a:t>
+            </a:r>
+          </a:p>
+        </p:txBody>
+      </p:sp>
+      <p:sp>
+        <p:nvSpPr>
+          <p:cNvPr id="8" name="Rectangle 7"/>
+          <p:cNvSpPr/>
+          <p:nvPr/>
+        </p:nvSpPr>
+        <p:spPr>
+          <a:xfrm>
+            <a:off x="4419600" y="3124200"/>
+            <a:ext cx="4000500" cy="304800"/>
+          </a:xfrm>
+          <a:prstGeom prst="rect">
+            <a:avLst/>
+          </a:prstGeom>
+          <a:solidFill>
+            <a:schemeClr val="bg2"/>
+          </a:solidFill>
+        </p:spPr>
+        <p:style>
+          <a:lnRef idx="2">
+            <a:schemeClr val="accent1">
+              <a:shade val="50000"/>
+            </a:schemeClr>
+          </a:lnRef>
+          <a:fillRef idx="1">
+            <a:schemeClr val="accent1"/>
+          </a:fillRef>
+          <a:effectRef idx="0">
+            <a:schemeClr val="accent1"/>
+          </a:effectRef>
+          <a:fontRef idx="minor">
+            <a:schemeClr val="lt1"/>
+          </a:fontRef>
+        </p:style>
+        <p:txBody>
+          <a:bodyPr rtlCol="0" anchor="ctr"/>
+          <a:lstStyle/>
+          <a:p>
+            <a:r>
+              <a:rPr lang="en-US" sz="1100" dirty="0" err="1" smtClean="0">
+                <a:solidFill>
+                  <a:schemeClr val="tx1"/>
+                </a:solidFill>
+                <a:latin typeface="Courier New" pitchFamily="49" charset="0"/>
+                <a:cs typeface="Courier New" pitchFamily="49" charset="0"/>
+              </a:rPr>
+              <a:t>ToxoDB</a:t>
+            </a:r>
+            <a:r>
+              <a:rPr lang="en-US" sz="1100" dirty="0" smtClean="0">
+                <a:solidFill>
+                  <a:schemeClr val="tx1"/>
+                </a:solidFill>
+                <a:latin typeface="Courier New" pitchFamily="49" charset="0"/>
+                <a:cs typeface="Courier New" pitchFamily="49" charset="0"/>
+              </a:rPr>
+              <a:t>/project.xml</a:t>
+            </a:r>
+          </a:p>
+        </p:txBody>
+      </p:sp>
+      <p:sp>
+        <p:nvSpPr>
+          <p:cNvPr id="9" name="Rectangle 8"/>
+          <p:cNvSpPr/>
+          <p:nvPr/>
+        </p:nvSpPr>
+        <p:spPr>
+          <a:xfrm>
+            <a:off x="4419600" y="3657600"/>
+            <a:ext cx="4000500" cy="304800"/>
+          </a:xfrm>
+          <a:prstGeom prst="rect">
+            <a:avLst/>
+          </a:prstGeom>
+          <a:solidFill>
+            <a:schemeClr val="bg2"/>
+          </a:solidFill>
+        </p:spPr>
+        <p:style>
+          <a:lnRef idx="2">
+            <a:schemeClr val="accent1">
+              <a:shade val="50000"/>
+            </a:schemeClr>
+          </a:lnRef>
+          <a:fillRef idx="1">
+            <a:schemeClr val="accent1"/>
+          </a:fillRef>
+          <a:effectRef idx="0">
+            <a:schemeClr val="accent1"/>
+          </a:effectRef>
+          <a:fontRef idx="minor">
+            <a:schemeClr val="lt1"/>
+          </a:fontRef>
+        </p:style>
+        <p:txBody>
+          <a:bodyPr rtlCol="0" anchor="ctr"/>
+          <a:lstStyle/>
+          <a:p>
+            <a:r>
+              <a:rPr lang="en-US" sz="1100" dirty="0" err="1" smtClean="0">
+                <a:solidFill>
+                  <a:schemeClr val="tx1"/>
+                </a:solidFill>
+                <a:latin typeface="Courier New" pitchFamily="49" charset="0"/>
+                <a:cs typeface="Courier New" pitchFamily="49" charset="0"/>
+              </a:rPr>
+              <a:t>ToxoDB</a:t>
+            </a:r>
+            <a:r>
+              <a:rPr lang="en-US" sz="1100" dirty="0" smtClean="0">
+                <a:solidFill>
+                  <a:schemeClr val="tx1"/>
+                </a:solidFill>
+                <a:latin typeface="Courier New" pitchFamily="49" charset="0"/>
+                <a:cs typeface="Courier New" pitchFamily="49" charset="0"/>
+              </a:rPr>
+              <a:t>/tgonME49/ESTs.xml</a:t>
+            </a:r>
+          </a:p>
+        </p:txBody>
+      </p:sp>
+      <p:sp>
+        <p:nvSpPr>
+          <p:cNvPr id="10" name="Rectangle 9"/>
+          <p:cNvSpPr/>
+          <p:nvPr/>
+        </p:nvSpPr>
+        <p:spPr>
+          <a:xfrm>
+            <a:off x="4419600" y="5791200"/>
+            <a:ext cx="4000500" cy="304800"/>
+          </a:xfrm>
+          <a:prstGeom prst="rect">
+            <a:avLst/>
+          </a:prstGeom>
+          <a:solidFill>
+            <a:schemeClr val="bg2"/>
+          </a:solidFill>
+        </p:spPr>
+        <p:style>
+          <a:lnRef idx="2">
+            <a:schemeClr val="accent1">
+              <a:shade val="50000"/>
+            </a:schemeClr>
+          </a:lnRef>
+          <a:fillRef idx="1">
+            <a:schemeClr val="accent1"/>
+          </a:fillRef>
+          <a:effectRef idx="0">
+            <a:schemeClr val="accent1"/>
+          </a:effectRef>
+          <a:fontRef idx="minor">
+            <a:schemeClr val="lt1"/>
+          </a:fontRef>
+        </p:style>
+        <p:txBody>
+          <a:bodyPr rtlCol="0" anchor="ctr"/>
+          <a:lstStyle/>
+          <a:p>
+            <a:r>
+              <a:rPr lang="en-US" sz="1100" dirty="0" err="1" smtClean="0">
+                <a:solidFill>
+                  <a:schemeClr val="tx1"/>
+                </a:solidFill>
+                <a:latin typeface="Courier New" pitchFamily="49" charset="0"/>
+                <a:cs typeface="Courier New" pitchFamily="49" charset="0"/>
+              </a:rPr>
+              <a:t>ToxoDB</a:t>
+            </a:r>
+            <a:r>
+              <a:rPr lang="en-US" sz="1100" dirty="0" smtClean="0">
+                <a:solidFill>
+                  <a:schemeClr val="tx1"/>
+                </a:solidFill>
+                <a:latin typeface="Courier New" pitchFamily="49" charset="0"/>
+                <a:cs typeface="Courier New" pitchFamily="49" charset="0"/>
+              </a:rPr>
+              <a:t>/tgonME49/Einstein/chipChipSamples.xml</a:t>
+            </a:r>
+          </a:p>
+        </p:txBody>
+      </p:sp>
+      <p:sp>
+        <p:nvSpPr>
+          <p:cNvPr id="12" name="Rectangle 11"/>
+          <p:cNvSpPr/>
+          <p:nvPr/>
+        </p:nvSpPr>
+        <p:spPr>
+          <a:xfrm>
+            <a:off x="4419600" y="4191000"/>
+            <a:ext cx="4000500" cy="304800"/>
+          </a:xfrm>
+          <a:prstGeom prst="rect">
+            <a:avLst/>
+          </a:prstGeom>
+          <a:solidFill>
+            <a:schemeClr val="bg2"/>
+          </a:solidFill>
+        </p:spPr>
+        <p:style>
+          <a:lnRef idx="2">
+            <a:schemeClr val="accent1">
+              <a:shade val="50000"/>
+            </a:schemeClr>
+          </a:lnRef>
+          <a:fillRef idx="1">
+            <a:schemeClr val="accent1"/>
+          </a:fillRef>
+          <a:effectRef idx="0">
+            <a:schemeClr val="accent1"/>
+          </a:effectRef>
+          <a:fontRef idx="minor">
+            <a:schemeClr val="lt1"/>
+          </a:fontRef>
+        </p:style>
+        <p:txBody>
+          <a:bodyPr rtlCol="0" anchor="ctr"/>
+          <a:lstStyle/>
+          <a:p>
+            <a:r>
+              <a:rPr lang="en-US" sz="1100" dirty="0" err="1" smtClean="0">
+                <a:solidFill>
+                  <a:schemeClr val="tx1"/>
+                </a:solidFill>
+                <a:latin typeface="Courier New" pitchFamily="49" charset="0"/>
+                <a:cs typeface="Courier New" pitchFamily="49" charset="0"/>
+              </a:rPr>
+              <a:t>ToxoDB</a:t>
+            </a:r>
+            <a:r>
+              <a:rPr lang="en-US" sz="1100" dirty="0" smtClean="0">
+                <a:solidFill>
+                  <a:schemeClr val="tx1"/>
+                </a:solidFill>
+                <a:latin typeface="Courier New" pitchFamily="49" charset="0"/>
+                <a:cs typeface="Courier New" pitchFamily="49" charset="0"/>
+              </a:rPr>
+              <a:t>/tgonME49/dbXRefs.xml</a:t>
+            </a:r>
+          </a:p>
+        </p:txBody>
+      </p:sp>
+      <p:sp>
+        <p:nvSpPr>
+          <p:cNvPr id="13" name="Rectangle 12"/>
+          <p:cNvSpPr/>
+          <p:nvPr/>
+        </p:nvSpPr>
+        <p:spPr>
+          <a:xfrm>
+            <a:off x="4419600" y="4724400"/>
+            <a:ext cx="4000500" cy="304800"/>
+          </a:xfrm>
+          <a:prstGeom prst="rect">
+            <a:avLst/>
+          </a:prstGeom>
+          <a:solidFill>
+            <a:schemeClr val="bg2"/>
+          </a:solidFill>
+        </p:spPr>
+        <p:style>
+          <a:lnRef idx="2">
+            <a:schemeClr val="accent1">
+              <a:shade val="50000"/>
+            </a:schemeClr>
+          </a:lnRef>
+          <a:fillRef idx="1">
+            <a:schemeClr val="accent1"/>
+          </a:fillRef>
+          <a:effectRef idx="0">
+            <a:schemeClr val="accent1"/>
+          </a:effectRef>
+          <a:fontRef idx="minor">
+            <a:schemeClr val="lt1"/>
+          </a:fontRef>
+        </p:style>
+        <p:txBody>
+          <a:bodyPr rtlCol="0" anchor="ctr"/>
+          <a:lstStyle/>
+          <a:p>
+            <a:r>
+              <a:rPr lang="en-US" sz="1100" dirty="0" err="1" smtClean="0">
+                <a:solidFill>
+                  <a:schemeClr val="tx1"/>
+                </a:solidFill>
+                <a:latin typeface="Courier New" pitchFamily="49" charset="0"/>
+                <a:cs typeface="Courier New" pitchFamily="49" charset="0"/>
+              </a:rPr>
+              <a:t>ToxoDB</a:t>
+            </a:r>
+            <a:r>
+              <a:rPr lang="en-US" sz="1100" dirty="0" smtClean="0">
+                <a:solidFill>
+                  <a:schemeClr val="tx1"/>
+                </a:solidFill>
+                <a:latin typeface="Courier New" pitchFamily="49" charset="0"/>
+                <a:cs typeface="Courier New" pitchFamily="49" charset="0"/>
+              </a:rPr>
+              <a:t>/tgonME49/arrayStudies.xml</a:t>
+            </a:r>
+          </a:p>
+        </p:txBody>
+      </p:sp>
+      <p:sp>
+        <p:nvSpPr>
+          <p:cNvPr id="14" name="Rectangle 13"/>
+          <p:cNvSpPr/>
+          <p:nvPr/>
+        </p:nvSpPr>
+        <p:spPr>
+          <a:xfrm>
+            <a:off x="4419600" y="5257800"/>
+            <a:ext cx="4000500" cy="304800"/>
+          </a:xfrm>
+          <a:prstGeom prst="rect">
+            <a:avLst/>
+          </a:prstGeom>
+          <a:solidFill>
+            <a:schemeClr val="bg2"/>
+          </a:solidFill>
+        </p:spPr>
+        <p:style>
+          <a:lnRef idx="2">
+            <a:schemeClr val="accent1">
+              <a:shade val="50000"/>
+            </a:schemeClr>
+          </a:lnRef>
+          <a:fillRef idx="1">
+            <a:schemeClr val="accent1"/>
+          </a:fillRef>
+          <a:effectRef idx="0">
+            <a:schemeClr val="accent1"/>
+          </a:effectRef>
+          <a:fontRef idx="minor">
+            <a:schemeClr val="lt1"/>
+          </a:fontRef>
+        </p:style>
+        <p:txBody>
+          <a:bodyPr rtlCol="0" anchor="ctr"/>
+          <a:lstStyle/>
+          <a:p>
+            <a:r>
+              <a:rPr lang="en-US" sz="1100" dirty="0" err="1" smtClean="0">
+                <a:solidFill>
+                  <a:schemeClr val="tx1"/>
+                </a:solidFill>
+                <a:latin typeface="Courier New" pitchFamily="49" charset="0"/>
+                <a:cs typeface="Courier New" pitchFamily="49" charset="0"/>
+              </a:rPr>
+              <a:t>ToxoDB</a:t>
+            </a:r>
+            <a:r>
+              <a:rPr lang="en-US" sz="1100" dirty="0" smtClean="0">
+                <a:solidFill>
+                  <a:schemeClr val="tx1"/>
+                </a:solidFill>
+                <a:latin typeface="Courier New" pitchFamily="49" charset="0"/>
+                <a:cs typeface="Courier New" pitchFamily="49" charset="0"/>
+              </a:rPr>
+              <a:t>/tgonME49/SNPs.xml</a:t>
+            </a:r>
+          </a:p>
+        </p:txBody>
+      </p:sp>
+      <p:cxnSp>
+        <p:nvCxnSpPr>
+          <p:cNvPr id="19" name="Curved Connector 18"/>
+          <p:cNvCxnSpPr>
+            <a:stCxn id="2" idx="1"/>
+            <a:endCxn id="5" idx="1"/>
+          </p:cNvCxnSpPr>
+          <p:nvPr/>
+        </p:nvCxnSpPr>
+        <p:spPr>
+          <a:xfrm rot="10800000" flipV="1">
+            <a:off x="457200" y="457200"/>
+            <a:ext cx="2743200" cy="2819400"/>
+          </a:xfrm>
+          <a:prstGeom prst="curvedConnector3">
+            <a:avLst>
+              <a:gd name="adj1" fmla="val 108333"/>
+            </a:avLst>
+          </a:prstGeom>
+          <a:ln w="25400">
+            <a:tailEnd type="stealth" w="lg" len="lg"/>
+          </a:ln>
+        </p:spPr>
+        <p:style>
+          <a:lnRef idx="1">
+            <a:schemeClr val="accent1"/>
+          </a:lnRef>
+          <a:fillRef idx="0">
+            <a:schemeClr val="accent1"/>
+          </a:fillRef>
+          <a:effectRef idx="0">
+            <a:schemeClr val="accent1"/>
+          </a:effectRef>
+          <a:fontRef idx="minor">
+            <a:schemeClr val="tx1"/>
+          </a:fontRef>
+        </p:style>
+      </p:cxnSp>
+      <p:cxnSp>
+        <p:nvCxnSpPr>
+          <p:cNvPr id="22" name="Curved Connector 21"/>
+          <p:cNvCxnSpPr>
+            <a:stCxn id="3" idx="1"/>
+            <a:endCxn id="6" idx="1"/>
+          </p:cNvCxnSpPr>
+          <p:nvPr/>
+        </p:nvCxnSpPr>
+        <p:spPr>
+          <a:xfrm rot="10800000" flipV="1">
+            <a:off x="457200" y="990600"/>
+            <a:ext cx="2743200" cy="2819400"/>
+          </a:xfrm>
+          <a:prstGeom prst="curvedConnector3">
+            <a:avLst>
+              <a:gd name="adj1" fmla="val 108333"/>
+            </a:avLst>
+          </a:prstGeom>
+          <a:ln w="25400">
+            <a:tailEnd type="stealth" w="lg" len="lg"/>
+          </a:ln>
+        </p:spPr>
+        <p:style>
+          <a:lnRef idx="1">
+            <a:schemeClr val="accent1"/>
+          </a:lnRef>
+          <a:fillRef idx="0">
+            <a:schemeClr val="accent1"/>
+          </a:fillRef>
+          <a:effectRef idx="0">
+            <a:schemeClr val="accent1"/>
+          </a:effectRef>
+          <a:fontRef idx="minor">
+            <a:schemeClr val="tx1"/>
+          </a:fontRef>
+        </p:style>
+      </p:cxnSp>
+      <p:cxnSp>
+        <p:nvCxnSpPr>
+          <p:cNvPr id="25" name="Curved Connector 24"/>
+          <p:cNvCxnSpPr>
+            <a:stCxn id="4" idx="1"/>
+            <a:endCxn id="7" idx="1"/>
+          </p:cNvCxnSpPr>
+          <p:nvPr/>
+        </p:nvCxnSpPr>
+        <p:spPr>
+          <a:xfrm rot="10800000" flipV="1">
+            <a:off x="457200" y="1524000"/>
+            <a:ext cx="2743200" cy="2819400"/>
+          </a:xfrm>
+          <a:prstGeom prst="curvedConnector3">
+            <a:avLst>
+              <a:gd name="adj1" fmla="val 108333"/>
+            </a:avLst>
+          </a:prstGeom>
+          <a:ln w="25400">
+            <a:tailEnd type="stealth" w="lg" len="lg"/>
+          </a:ln>
+        </p:spPr>
+        <p:style>
+          <a:lnRef idx="1">
+            <a:schemeClr val="accent1"/>
+          </a:lnRef>
+          <a:fillRef idx="0">
+            <a:schemeClr val="accent1"/>
+          </a:fillRef>
+          <a:effectRef idx="0">
+            <a:schemeClr val="accent1"/>
+          </a:effectRef>
+          <a:fontRef idx="minor">
+            <a:schemeClr val="tx1"/>
+          </a:fontRef>
+        </p:style>
+      </p:cxnSp>
+      <p:cxnSp>
+        <p:nvCxnSpPr>
+          <p:cNvPr id="28" name="Curved Connector 27"/>
+          <p:cNvCxnSpPr>
+            <a:stCxn id="2" idx="3"/>
+            <a:endCxn id="8" idx="3"/>
+          </p:cNvCxnSpPr>
+          <p:nvPr/>
+        </p:nvCxnSpPr>
+        <p:spPr>
+          <a:xfrm>
+            <a:off x="5867400" y="457200"/>
+            <a:ext cx="2552700" cy="2819400"/>
+          </a:xfrm>
+          <a:prstGeom prst="curvedConnector3">
+            <a:avLst>
+              <a:gd name="adj1" fmla="val 108955"/>
+            </a:avLst>
+          </a:prstGeom>
+          <a:ln w="25400">
+            <a:tailEnd type="stealth" w="lg" len="lg"/>
+          </a:ln>
+        </p:spPr>
+        <p:style>
+          <a:lnRef idx="1">
+            <a:schemeClr val="accent1"/>
+          </a:lnRef>
+          <a:fillRef idx="0">
+            <a:schemeClr val="accent1"/>
+          </a:fillRef>
+          <a:effectRef idx="0">
+            <a:schemeClr val="accent1"/>
+          </a:effectRef>
+          <a:fontRef idx="minor">
+            <a:schemeClr val="tx1"/>
+          </a:fontRef>
+        </p:style>
+      </p:cxnSp>
+      <p:sp>
+        <p:nvSpPr>
+          <p:cNvPr id="31" name="Right Brace 30"/>
+          <p:cNvSpPr/>
+          <p:nvPr/>
+        </p:nvSpPr>
+        <p:spPr>
+          <a:xfrm>
+            <a:off x="8458200" y="3581400"/>
+            <a:ext cx="228600" cy="2057400"/>
+          </a:xfrm>
+          <a:prstGeom prst="rightBrace">
+            <a:avLst/>
+          </a:prstGeom>
+          <a:ln>
+            <a:solidFill>
+              <a:schemeClr val="tx2">
+                <a:lumMod val="50000"/>
+              </a:schemeClr>
+            </a:solidFill>
+          </a:ln>
+        </p:spPr>
+        <p:style>
+          <a:lnRef idx="1">
+            <a:schemeClr val="accent1"/>
+          </a:lnRef>
+          <a:fillRef idx="0">
+            <a:schemeClr val="accent1"/>
+          </a:fillRef>
+          <a:effectRef idx="0">
+            <a:schemeClr val="accent1"/>
+          </a:effectRef>
+          <a:fontRef idx="minor">
+            <a:schemeClr val="tx1"/>
+          </a:fontRef>
+        </p:style>
+        <p:txBody>
+          <a:bodyPr rtlCol="0" anchor="ctr"/>
+          <a:lstStyle/>
+          <a:p>
+            <a:pPr algn="ctr"/>
+            <a:endParaRPr lang="en-US"/>
+          </a:p>
+        </p:txBody>
+      </p:sp>
+      <p:cxnSp>
+        <p:nvCxnSpPr>
+          <p:cNvPr id="32" name="Curved Connector 31"/>
+          <p:cNvCxnSpPr>
+            <a:stCxn id="3" idx="3"/>
+            <a:endCxn id="31" idx="1"/>
+          </p:cNvCxnSpPr>
+          <p:nvPr/>
+        </p:nvCxnSpPr>
+        <p:spPr>
+          <a:xfrm>
+            <a:off x="5867400" y="990600"/>
+            <a:ext cx="2819400" cy="3619500"/>
+          </a:xfrm>
+          <a:prstGeom prst="curvedConnector3">
+            <a:avLst>
+              <a:gd name="adj1" fmla="val 111622"/>
+            </a:avLst>
+          </a:prstGeom>
+          <a:ln w="25400">
+            <a:tailEnd type="stealth" w="lg" len="lg"/>
+          </a:ln>
+        </p:spPr>
+        <p:style>
+          <a:lnRef idx="1">
+            <a:schemeClr val="accent1"/>
+          </a:lnRef>
+          <a:fillRef idx="0">
+            <a:schemeClr val="accent1"/>
+          </a:fillRef>
+          <a:effectRef idx="0">
+            <a:schemeClr val="accent1"/>
+          </a:effectRef>
+          <a:fontRef idx="minor">
+            <a:schemeClr val="tx1"/>
+          </a:fontRef>
+        </p:style>
+      </p:cxnSp>
+      <p:cxnSp>
+        <p:nvCxnSpPr>
+          <p:cNvPr id="36" name="Curved Connector 35"/>
+          <p:cNvCxnSpPr>
+            <a:stCxn id="4" idx="3"/>
+            <a:endCxn id="10" idx="3"/>
+          </p:cNvCxnSpPr>
+          <p:nvPr/>
+        </p:nvCxnSpPr>
+        <p:spPr>
+          <a:xfrm>
+            <a:off x="5867400" y="1524000"/>
+            <a:ext cx="2552700" cy="4419600"/>
+          </a:xfrm>
+          <a:prstGeom prst="curvedConnector3">
+            <a:avLst>
+              <a:gd name="adj1" fmla="val 124819"/>
+            </a:avLst>
+          </a:prstGeom>
+          <a:ln w="25400">
+            <a:tailEnd type="stealth" w="lg" len="lg"/>
+          </a:ln>
+        </p:spPr>
+        <p:style>
+          <a:lnRef idx="1">
+            <a:schemeClr val="accent1"/>
+          </a:lnRef>
+          <a:fillRef idx="0">
+            <a:schemeClr val="accent1"/>
+          </a:fillRef>
+          <a:effectRef idx="0">
+            <a:schemeClr val="accent1"/>
+          </a:effectRef>
+          <a:fontRef idx="minor">
+            <a:schemeClr val="tx1"/>
+          </a:fontRef>
+        </p:style>
+      </p:cxnSp>
+    </p:spTree>
+  </p:cSld>
+  <p:clrMapOvr>
+    <a:masterClrMapping/>
+  </p:clrMapOvr>
 </p:sld>
 </file>
 

</xml_diff>